<commit_message>
mass from radius plots
</commit_message>
<xml_diff>
--- a/figures/draft_figures.pptx
+++ b/figures/draft_figures.pptx
@@ -7,6 +7,7 @@
   <p:sldIdLst>
     <p:sldId id="256" r:id="rId2"/>
     <p:sldId id="257" r:id="rId3"/>
+    <p:sldId id="258" r:id="rId4"/>
   </p:sldIdLst>
   <p:sldSz cx="12192000" cy="6858000"/>
   <p:notesSz cx="6858000" cy="9144000"/>
@@ -105,6 +106,11 @@
       </a:defRPr>
     </a:lvl9pPr>
   </p:defaultTextStyle>
+  <p:extLst>
+    <p:ext uri="{EFAFB233-063F-42B5-8137-9DF3F51BA10A}">
+      <p15:sldGuideLst xmlns:p15="http://schemas.microsoft.com/office/powerpoint/2012/main"/>
+    </p:ext>
+  </p:extLst>
 </p:presentation>
 </file>
 
@@ -239,7 +245,7 @@
           <a:p>
             <a:fld id="{C92751A7-202A-2347-9008-53922F7026D7}" type="datetimeFigureOut">
               <a:rPr lang="en-US" smtClean="0"/>
-              <a:t>4/16/18</a:t>
+              <a:t>4/27/18</a:t>
             </a:fld>
             <a:endParaRPr lang="en-US"/>
           </a:p>
@@ -409,7 +415,7 @@
           <a:p>
             <a:fld id="{C92751A7-202A-2347-9008-53922F7026D7}" type="datetimeFigureOut">
               <a:rPr lang="en-US" smtClean="0"/>
-              <a:t>4/16/18</a:t>
+              <a:t>4/27/18</a:t>
             </a:fld>
             <a:endParaRPr lang="en-US"/>
           </a:p>
@@ -589,7 +595,7 @@
           <a:p>
             <a:fld id="{C92751A7-202A-2347-9008-53922F7026D7}" type="datetimeFigureOut">
               <a:rPr lang="en-US" smtClean="0"/>
-              <a:t>4/16/18</a:t>
+              <a:t>4/27/18</a:t>
             </a:fld>
             <a:endParaRPr lang="en-US"/>
           </a:p>
@@ -759,7 +765,7 @@
           <a:p>
             <a:fld id="{C92751A7-202A-2347-9008-53922F7026D7}" type="datetimeFigureOut">
               <a:rPr lang="en-US" smtClean="0"/>
-              <a:t>4/16/18</a:t>
+              <a:t>4/27/18</a:t>
             </a:fld>
             <a:endParaRPr lang="en-US"/>
           </a:p>
@@ -1005,7 +1011,7 @@
           <a:p>
             <a:fld id="{C92751A7-202A-2347-9008-53922F7026D7}" type="datetimeFigureOut">
               <a:rPr lang="en-US" smtClean="0"/>
-              <a:t>4/16/18</a:t>
+              <a:t>4/27/18</a:t>
             </a:fld>
             <a:endParaRPr lang="en-US"/>
           </a:p>
@@ -1237,7 +1243,7 @@
           <a:p>
             <a:fld id="{C92751A7-202A-2347-9008-53922F7026D7}" type="datetimeFigureOut">
               <a:rPr lang="en-US" smtClean="0"/>
-              <a:t>4/16/18</a:t>
+              <a:t>4/27/18</a:t>
             </a:fld>
             <a:endParaRPr lang="en-US"/>
           </a:p>
@@ -1604,7 +1610,7 @@
           <a:p>
             <a:fld id="{C92751A7-202A-2347-9008-53922F7026D7}" type="datetimeFigureOut">
               <a:rPr lang="en-US" smtClean="0"/>
-              <a:t>4/16/18</a:t>
+              <a:t>4/27/18</a:t>
             </a:fld>
             <a:endParaRPr lang="en-US"/>
           </a:p>
@@ -1722,7 +1728,7 @@
           <a:p>
             <a:fld id="{C92751A7-202A-2347-9008-53922F7026D7}" type="datetimeFigureOut">
               <a:rPr lang="en-US" smtClean="0"/>
-              <a:t>4/16/18</a:t>
+              <a:t>4/27/18</a:t>
             </a:fld>
             <a:endParaRPr lang="en-US"/>
           </a:p>
@@ -1817,7 +1823,7 @@
           <a:p>
             <a:fld id="{C92751A7-202A-2347-9008-53922F7026D7}" type="datetimeFigureOut">
               <a:rPr lang="en-US" smtClean="0"/>
-              <a:t>4/16/18</a:t>
+              <a:t>4/27/18</a:t>
             </a:fld>
             <a:endParaRPr lang="en-US"/>
           </a:p>
@@ -2094,7 +2100,7 @@
           <a:p>
             <a:fld id="{C92751A7-202A-2347-9008-53922F7026D7}" type="datetimeFigureOut">
               <a:rPr lang="en-US" smtClean="0"/>
-              <a:t>4/16/18</a:t>
+              <a:t>4/27/18</a:t>
             </a:fld>
             <a:endParaRPr lang="en-US"/>
           </a:p>
@@ -2347,7 +2353,7 @@
           <a:p>
             <a:fld id="{C92751A7-202A-2347-9008-53922F7026D7}" type="datetimeFigureOut">
               <a:rPr lang="en-US" smtClean="0"/>
-              <a:t>4/16/18</a:t>
+              <a:t>4/27/18</a:t>
             </a:fld>
             <a:endParaRPr lang="en-US"/>
           </a:p>
@@ -2560,7 +2566,7 @@
           <a:p>
             <a:fld id="{C92751A7-202A-2347-9008-53922F7026D7}" type="datetimeFigureOut">
               <a:rPr lang="en-US" smtClean="0"/>
-              <a:t>4/16/18</a:t>
+              <a:t>4/27/18</a:t>
             </a:fld>
             <a:endParaRPr lang="en-US"/>
           </a:p>
@@ -3279,6 +3285,238 @@
 </p:sld>
 </file>
 
+<file path=ppt/slides/slide3.xml><?xml version="1.0" encoding="utf-8"?>
+<p:sld xmlns:a="http://schemas.openxmlformats.org/drawingml/2006/main" xmlns:r="http://schemas.openxmlformats.org/officeDocument/2006/relationships" xmlns:p="http://schemas.openxmlformats.org/presentationml/2006/main">
+  <p:cSld>
+    <p:spTree>
+      <p:nvGrpSpPr>
+        <p:cNvPr id="1" name=""/>
+        <p:cNvGrpSpPr/>
+        <p:nvPr/>
+      </p:nvGrpSpPr>
+      <p:grpSpPr>
+        <a:xfrm>
+          <a:off x="0" y="0"/>
+          <a:ext cx="0" cy="0"/>
+          <a:chOff x="0" y="0"/>
+          <a:chExt cx="0" cy="0"/>
+        </a:xfrm>
+      </p:grpSpPr>
+      <p:pic>
+        <p:nvPicPr>
+          <p:cNvPr id="11" name="Picture 10"/>
+          <p:cNvPicPr>
+            <a:picLocks noChangeAspect="1"/>
+          </p:cNvPicPr>
+          <p:nvPr/>
+        </p:nvPicPr>
+        <p:blipFill>
+          <a:blip r:embed="rId2"/>
+          <a:stretch>
+            <a:fillRect/>
+          </a:stretch>
+        </p:blipFill>
+        <p:spPr>
+          <a:xfrm>
+            <a:off x="3933900" y="2231543"/>
+            <a:ext cx="3841663" cy="3863174"/>
+          </a:xfrm>
+          <a:prstGeom prst="rect">
+            <a:avLst/>
+          </a:prstGeom>
+        </p:spPr>
+      </p:pic>
+      <p:pic>
+        <p:nvPicPr>
+          <p:cNvPr id="10" name="Picture 9"/>
+          <p:cNvPicPr>
+            <a:picLocks noChangeAspect="1"/>
+          </p:cNvPicPr>
+          <p:nvPr/>
+        </p:nvPicPr>
+        <p:blipFill>
+          <a:blip r:embed="rId3"/>
+          <a:stretch>
+            <a:fillRect/>
+          </a:stretch>
+        </p:blipFill>
+        <p:spPr>
+          <a:xfrm>
+            <a:off x="7964847" y="2160618"/>
+            <a:ext cx="3907823" cy="3938490"/>
+          </a:xfrm>
+          <a:prstGeom prst="rect">
+            <a:avLst/>
+          </a:prstGeom>
+        </p:spPr>
+      </p:pic>
+      <p:pic>
+        <p:nvPicPr>
+          <p:cNvPr id="4" name="Picture 3"/>
+          <p:cNvPicPr>
+            <a:picLocks noChangeAspect="1"/>
+          </p:cNvPicPr>
+          <p:nvPr/>
+        </p:nvPicPr>
+        <p:blipFill>
+          <a:blip r:embed="rId4"/>
+          <a:stretch>
+            <a:fillRect/>
+          </a:stretch>
+        </p:blipFill>
+        <p:spPr>
+          <a:xfrm>
+            <a:off x="-1" y="2160618"/>
+            <a:ext cx="3744617" cy="3895784"/>
+          </a:xfrm>
+          <a:prstGeom prst="rect">
+            <a:avLst/>
+          </a:prstGeom>
+        </p:spPr>
+      </p:pic>
+      <p:sp>
+        <p:nvSpPr>
+          <p:cNvPr id="5" name="TextBox 4"/>
+          <p:cNvSpPr txBox="1"/>
+          <p:nvPr/>
+        </p:nvSpPr>
+        <p:spPr>
+          <a:xfrm>
+            <a:off x="2498762" y="2443874"/>
+            <a:ext cx="1245854" cy="369332"/>
+          </a:xfrm>
+          <a:prstGeom prst="rect">
+            <a:avLst/>
+          </a:prstGeom>
+          <a:noFill/>
+        </p:spPr>
+        <p:txBody>
+          <a:bodyPr wrap="none" rtlCol="0">
+            <a:spAutoFit/>
+          </a:bodyPr>
+          <a:lstStyle/>
+          <a:p>
+            <a:r>
+              <a:rPr lang="en-US" dirty="0" smtClean="0">
+                <a:latin typeface="Futura Medium" charset="0"/>
+                <a:ea typeface="Futura Medium" charset="0"/>
+                <a:cs typeface="Futura Medium" charset="0"/>
+              </a:rPr>
+              <a:t>a) K2-28b</a:t>
+            </a:r>
+            <a:endParaRPr lang="en-US" dirty="0">
+              <a:latin typeface="Futura Medium" charset="0"/>
+              <a:ea typeface="Futura Medium" charset="0"/>
+              <a:cs typeface="Futura Medium" charset="0"/>
+            </a:endParaRPr>
+          </a:p>
+        </p:txBody>
+      </p:sp>
+      <p:sp>
+        <p:nvSpPr>
+          <p:cNvPr id="6" name="TextBox 5"/>
+          <p:cNvSpPr txBox="1"/>
+          <p:nvPr/>
+        </p:nvSpPr>
+        <p:spPr>
+          <a:xfrm>
+            <a:off x="6400891" y="2443874"/>
+            <a:ext cx="1374672" cy="369332"/>
+          </a:xfrm>
+          <a:prstGeom prst="rect">
+            <a:avLst/>
+          </a:prstGeom>
+          <a:noFill/>
+        </p:spPr>
+        <p:txBody>
+          <a:bodyPr wrap="none" rtlCol="0">
+            <a:spAutoFit/>
+          </a:bodyPr>
+          <a:lstStyle/>
+          <a:p>
+            <a:r>
+              <a:rPr lang="en-US" dirty="0">
+                <a:latin typeface="Futura Medium" charset="0"/>
+                <a:ea typeface="Futura Medium" charset="0"/>
+                <a:cs typeface="Futura Medium" charset="0"/>
+              </a:rPr>
+              <a:t>b</a:t>
+            </a:r>
+            <a:r>
+              <a:rPr lang="en-US" dirty="0" smtClean="0">
+                <a:latin typeface="Futura Medium" charset="0"/>
+                <a:ea typeface="Futura Medium" charset="0"/>
+                <a:cs typeface="Futura Medium" charset="0"/>
+              </a:rPr>
+              <a:t>) K2-100b</a:t>
+            </a:r>
+            <a:endParaRPr lang="en-US" dirty="0">
+              <a:latin typeface="Futura Medium" charset="0"/>
+              <a:ea typeface="Futura Medium" charset="0"/>
+              <a:cs typeface="Futura Medium" charset="0"/>
+            </a:endParaRPr>
+          </a:p>
+        </p:txBody>
+      </p:sp>
+      <p:sp>
+        <p:nvSpPr>
+          <p:cNvPr id="7" name="TextBox 6"/>
+          <p:cNvSpPr txBox="1"/>
+          <p:nvPr/>
+        </p:nvSpPr>
+        <p:spPr>
+          <a:xfrm>
+            <a:off x="10529417" y="2443874"/>
+            <a:ext cx="1343253" cy="369332"/>
+          </a:xfrm>
+          <a:prstGeom prst="rect">
+            <a:avLst/>
+          </a:prstGeom>
+          <a:noFill/>
+        </p:spPr>
+        <p:txBody>
+          <a:bodyPr wrap="none" rtlCol="0">
+            <a:spAutoFit/>
+          </a:bodyPr>
+          <a:lstStyle/>
+          <a:p>
+            <a:r>
+              <a:rPr lang="en-US" dirty="0">
+                <a:latin typeface="Futura Medium" charset="0"/>
+                <a:ea typeface="Futura Medium" charset="0"/>
+                <a:cs typeface="Futura Medium" charset="0"/>
+              </a:rPr>
+              <a:t>c</a:t>
+            </a:r>
+            <a:r>
+              <a:rPr lang="en-US" dirty="0" smtClean="0">
+                <a:latin typeface="Futura Medium" charset="0"/>
+                <a:ea typeface="Futura Medium" charset="0"/>
+                <a:cs typeface="Futura Medium" charset="0"/>
+              </a:rPr>
+              <a:t>) K2-104b</a:t>
+            </a:r>
+            <a:endParaRPr lang="en-US" dirty="0">
+              <a:latin typeface="Futura Medium" charset="0"/>
+              <a:ea typeface="Futura Medium" charset="0"/>
+              <a:cs typeface="Futura Medium" charset="0"/>
+            </a:endParaRPr>
+          </a:p>
+        </p:txBody>
+      </p:sp>
+    </p:spTree>
+    <p:extLst>
+      <p:ext uri="{BB962C8B-B14F-4D97-AF65-F5344CB8AC3E}">
+        <p14:creationId xmlns:p14="http://schemas.microsoft.com/office/powerpoint/2010/main" val="931028926"/>
+      </p:ext>
+    </p:extLst>
+  </p:cSld>
+  <p:clrMapOvr>
+    <a:masterClrMapping/>
+  </p:clrMapOvr>
+</p:sld>
+</file>
+
 <file path=ppt/theme/theme1.xml><?xml version="1.0" encoding="utf-8"?>
 <a:theme xmlns:a="http://schemas.openxmlformats.org/drawingml/2006/main" name="Office Theme">
   <a:themeElements>

</xml_diff>